<commit_message>
working on documents of pcsk9
</commit_message>
<xml_diff>
--- a/pcsk9/doc/pcsk9_report1.pptx
+++ b/pcsk9/doc/pcsk9_report1.pptx
@@ -288,7 +288,7 @@
           <a:p>
             <a:fld id="{FDB34168-5AB0-4E28-8742-C3BFA64AA5BC}" type="datetimeFigureOut">
               <a:rPr lang="en-GB" smtClean="0"/>
-              <a:t>21/06/2016</a:t>
+              <a:t>22/06/2016</a:t>
             </a:fld>
             <a:endParaRPr lang="en-GB"/>
           </a:p>
@@ -458,7 +458,7 @@
           <a:p>
             <a:fld id="{FDB34168-5AB0-4E28-8742-C3BFA64AA5BC}" type="datetimeFigureOut">
               <a:rPr lang="en-GB" smtClean="0"/>
-              <a:t>21/06/2016</a:t>
+              <a:t>22/06/2016</a:t>
             </a:fld>
             <a:endParaRPr lang="en-GB"/>
           </a:p>
@@ -638,7 +638,7 @@
           <a:p>
             <a:fld id="{FDB34168-5AB0-4E28-8742-C3BFA64AA5BC}" type="datetimeFigureOut">
               <a:rPr lang="en-GB" smtClean="0"/>
-              <a:t>21/06/2016</a:t>
+              <a:t>22/06/2016</a:t>
             </a:fld>
             <a:endParaRPr lang="en-GB"/>
           </a:p>
@@ -808,7 +808,7 @@
           <a:p>
             <a:fld id="{FDB34168-5AB0-4E28-8742-C3BFA64AA5BC}" type="datetimeFigureOut">
               <a:rPr lang="en-GB" smtClean="0"/>
-              <a:t>21/06/2016</a:t>
+              <a:t>22/06/2016</a:t>
             </a:fld>
             <a:endParaRPr lang="en-GB"/>
           </a:p>
@@ -1054,7 +1054,7 @@
           <a:p>
             <a:fld id="{FDB34168-5AB0-4E28-8742-C3BFA64AA5BC}" type="datetimeFigureOut">
               <a:rPr lang="en-GB" smtClean="0"/>
-              <a:t>21/06/2016</a:t>
+              <a:t>22/06/2016</a:t>
             </a:fld>
             <a:endParaRPr lang="en-GB"/>
           </a:p>
@@ -1342,7 +1342,7 @@
           <a:p>
             <a:fld id="{FDB34168-5AB0-4E28-8742-C3BFA64AA5BC}" type="datetimeFigureOut">
               <a:rPr lang="en-GB" smtClean="0"/>
-              <a:t>21/06/2016</a:t>
+              <a:t>22/06/2016</a:t>
             </a:fld>
             <a:endParaRPr lang="en-GB"/>
           </a:p>
@@ -1764,7 +1764,7 @@
           <a:p>
             <a:fld id="{FDB34168-5AB0-4E28-8742-C3BFA64AA5BC}" type="datetimeFigureOut">
               <a:rPr lang="en-GB" smtClean="0"/>
-              <a:t>21/06/2016</a:t>
+              <a:t>22/06/2016</a:t>
             </a:fld>
             <a:endParaRPr lang="en-GB"/>
           </a:p>
@@ -1882,7 +1882,7 @@
           <a:p>
             <a:fld id="{FDB34168-5AB0-4E28-8742-C3BFA64AA5BC}" type="datetimeFigureOut">
               <a:rPr lang="en-GB" smtClean="0"/>
-              <a:t>21/06/2016</a:t>
+              <a:t>22/06/2016</a:t>
             </a:fld>
             <a:endParaRPr lang="en-GB"/>
           </a:p>
@@ -1977,7 +1977,7 @@
           <a:p>
             <a:fld id="{FDB34168-5AB0-4E28-8742-C3BFA64AA5BC}" type="datetimeFigureOut">
               <a:rPr lang="en-GB" smtClean="0"/>
-              <a:t>21/06/2016</a:t>
+              <a:t>22/06/2016</a:t>
             </a:fld>
             <a:endParaRPr lang="en-GB"/>
           </a:p>
@@ -2254,7 +2254,7 @@
           <a:p>
             <a:fld id="{FDB34168-5AB0-4E28-8742-C3BFA64AA5BC}" type="datetimeFigureOut">
               <a:rPr lang="en-GB" smtClean="0"/>
-              <a:t>21/06/2016</a:t>
+              <a:t>22/06/2016</a:t>
             </a:fld>
             <a:endParaRPr lang="en-GB"/>
           </a:p>
@@ -2507,7 +2507,7 @@
           <a:p>
             <a:fld id="{FDB34168-5AB0-4E28-8742-C3BFA64AA5BC}" type="datetimeFigureOut">
               <a:rPr lang="en-GB" smtClean="0"/>
-              <a:t>21/06/2016</a:t>
+              <a:t>22/06/2016</a:t>
             </a:fld>
             <a:endParaRPr lang="en-GB"/>
           </a:p>
@@ -2720,7 +2720,7 @@
           <a:p>
             <a:fld id="{FDB34168-5AB0-4E28-8742-C3BFA64AA5BC}" type="datetimeFigureOut">
               <a:rPr lang="en-GB" smtClean="0"/>
-              <a:t>21/06/2016</a:t>
+              <a:t>22/06/2016</a:t>
             </a:fld>
             <a:endParaRPr lang="en-GB"/>
           </a:p>
@@ -3581,11 +3581,14 @@
                         </m:sSubPr>
                         <m:e>
                           <m:r>
-                            <a:rPr lang="en-GB" b="0" i="1" smtClean="0">
+                            <m:rPr>
+                              <m:sty m:val="p"/>
+                            </m:rPr>
+                            <a:rPr lang="el-GR" b="0" i="1" smtClean="0">
                               <a:latin typeface="Cambria Math"/>
                               <a:ea typeface="Cambria Math"/>
                             </a:rPr>
-                            <m:t>∆</m:t>
+                            <m:t>σ</m:t>
                           </m:r>
                         </m:e>
                         <m:sub>
@@ -3645,8 +3648,8 @@
           </p:sp>
         </mc:Fallback>
       </mc:AlternateContent>
-      <mc:AlternateContent xmlns:mc="http://schemas.openxmlformats.org/markup-compatibility/2006">
-        <mc:Choice xmlns:a14="http://schemas.microsoft.com/office/drawing/2010/main" Requires="a14">
+      <mc:AlternateContent xmlns:mc="http://schemas.openxmlformats.org/markup-compatibility/2006" xmlns:a14="http://schemas.microsoft.com/office/drawing/2010/main">
+        <mc:Choice Requires="a14">
           <p:sp>
             <p:nvSpPr>
               <p:cNvPr id="19" name="Flowchart: Alternate Process 18"/>
@@ -3739,7 +3742,7 @@
             </p:txBody>
           </p:sp>
         </mc:Choice>
-        <mc:Fallback>
+        <mc:Fallback xmlns="">
           <p:sp>
             <p:nvSpPr>
               <p:cNvPr id="19" name="Flowchart: Alternate Process 18"/>
@@ -3778,8 +3781,8 @@
           </p:sp>
         </mc:Fallback>
       </mc:AlternateContent>
-      <mc:AlternateContent xmlns:mc="http://schemas.openxmlformats.org/markup-compatibility/2006">
-        <mc:Choice xmlns:a14="http://schemas.microsoft.com/office/drawing/2010/main" Requires="a14">
+      <mc:AlternateContent xmlns:mc="http://schemas.openxmlformats.org/markup-compatibility/2006" xmlns:a14="http://schemas.microsoft.com/office/drawing/2010/main">
+        <mc:Choice Requires="a14">
           <p:sp>
             <p:nvSpPr>
               <p:cNvPr id="24" name="Flowchart: Alternate Process 23"/>
@@ -3872,7 +3875,7 @@
             </p:txBody>
           </p:sp>
         </mc:Choice>
-        <mc:Fallback>
+        <mc:Fallback xmlns="">
           <p:sp>
             <p:nvSpPr>
               <p:cNvPr id="24" name="Flowchart: Alternate Process 23"/>
@@ -3911,8 +3914,8 @@
           </p:sp>
         </mc:Fallback>
       </mc:AlternateContent>
-      <mc:AlternateContent xmlns:mc="http://schemas.openxmlformats.org/markup-compatibility/2006">
-        <mc:Choice xmlns:a14="http://schemas.microsoft.com/office/drawing/2010/main" Requires="a14">
+      <mc:AlternateContent xmlns:mc="http://schemas.openxmlformats.org/markup-compatibility/2006" xmlns:a14="http://schemas.microsoft.com/office/drawing/2010/main">
+        <mc:Choice Requires="a14">
           <p:sp>
             <p:nvSpPr>
               <p:cNvPr id="25" name="Flowchart: Alternate Process 24"/>
@@ -4005,7 +4008,7 @@
             </p:txBody>
           </p:sp>
         </mc:Choice>
-        <mc:Fallback>
+        <mc:Fallback xmlns="">
           <p:sp>
             <p:nvSpPr>
               <p:cNvPr id="25" name="Flowchart: Alternate Process 24"/>
@@ -4044,8 +4047,8 @@
           </p:sp>
         </mc:Fallback>
       </mc:AlternateContent>
-      <mc:AlternateContent xmlns:mc="http://schemas.openxmlformats.org/markup-compatibility/2006">
-        <mc:Choice xmlns:a14="http://schemas.microsoft.com/office/drawing/2010/main" Requires="a14">
+      <mc:AlternateContent xmlns:mc="http://schemas.openxmlformats.org/markup-compatibility/2006" xmlns:a14="http://schemas.microsoft.com/office/drawing/2010/main">
+        <mc:Choice Requires="a14">
           <p:sp>
             <p:nvSpPr>
               <p:cNvPr id="26" name="Flowchart: Alternate Process 25"/>
@@ -4138,7 +4141,7 @@
             </p:txBody>
           </p:sp>
         </mc:Choice>
-        <mc:Fallback>
+        <mc:Fallback xmlns="">
           <p:sp>
             <p:nvSpPr>
               <p:cNvPr id="26" name="Flowchart: Alternate Process 25"/>
@@ -4246,11 +4249,14 @@
                         </m:sSubPr>
                         <m:e>
                           <m:r>
-                            <a:rPr lang="en-GB" b="0" i="1" smtClean="0">
+                            <m:rPr>
+                              <m:sty m:val="p"/>
+                            </m:rPr>
+                            <a:rPr lang="el-GR" b="0" i="1" smtClean="0">
                               <a:latin typeface="Cambria Math"/>
                               <a:ea typeface="Cambria Math"/>
                             </a:rPr>
-                            <m:t>∆</m:t>
+                            <m:t>σ</m:t>
                           </m:r>
                         </m:e>
                         <m:sub>
@@ -4414,11 +4420,14 @@
                         </m:sSubPr>
                         <m:e>
                           <m:r>
-                            <a:rPr lang="en-GB" b="0" i="1" smtClean="0">
+                            <m:rPr>
+                              <m:sty m:val="p"/>
+                            </m:rPr>
+                            <a:rPr lang="el-GR" b="0" i="1" smtClean="0">
                               <a:latin typeface="Cambria Math"/>
                               <a:ea typeface="Cambria Math"/>
                             </a:rPr>
-                            <m:t>∆</m:t>
+                            <m:t>σ</m:t>
                           </m:r>
                         </m:e>
                         <m:sub>
@@ -4639,11 +4648,14 @@
                         </m:sSubPr>
                         <m:e>
                           <m:r>
-                            <a:rPr lang="en-GB" b="0" i="1" smtClean="0">
+                            <m:rPr>
+                              <m:sty m:val="p"/>
+                            </m:rPr>
+                            <a:rPr lang="en-GB" i="1">
                               <a:latin typeface="Cambria Math"/>
                               <a:ea typeface="Cambria Math"/>
                             </a:rPr>
-                            <m:t>∆</m:t>
+                            <m:t>σ</m:t>
                           </m:r>
                         </m:e>
                         <m:sub>
@@ -4684,7 +4696,7 @@
               <a:blipFill rotWithShape="1">
                 <a:blip r:embed="rId9"/>
                 <a:stretch>
-                  <a:fillRect l="-1596"/>
+                  <a:fillRect l="-1064"/>
                 </a:stretch>
               </a:blipFill>
             </p:spPr>

</xml_diff>